<commit_message>
changed some content of the Presentation
</commit_message>
<xml_diff>
--- a/meetup-presentation.pptx
+++ b/meetup-presentation.pptx
@@ -122,6 +122,11 @@
       </a:defRPr>
     </a:lvl9pPr>
   </p:defaultTextStyle>
+  <p:extLst>
+    <p:ext uri="{EFAFB233-063F-42B5-8137-9DF3F51BA10A}">
+      <p15:sldGuideLst xmlns:p15="http://schemas.microsoft.com/office/powerpoint/2012/main"/>
+    </p:ext>
+  </p:extLst>
 </p:presentation>
 </file>
 
@@ -393,13 +398,13 @@
   <p:clrMapOvr>
     <a:masterClrMapping/>
   </p:clrMapOvr>
-  <mc:AlternateContent xmlns:mc="http://schemas.openxmlformats.org/markup-compatibility/2006">
-    <mc:Choice xmlns:p14="http://schemas.microsoft.com/office/powerpoint/2010/main" Requires="p14">
+  <mc:AlternateContent xmlns:mc="http://schemas.openxmlformats.org/markup-compatibility/2006" xmlns:p14="http://schemas.microsoft.com/office/powerpoint/2010/main">
+    <mc:Choice Requires="p14">
       <p:transition spd="med" p14:dur="700">
         <p:fade/>
       </p:transition>
     </mc:Choice>
-    <mc:Fallback>
+    <mc:Fallback xmlns="">
       <p:transition spd="med">
         <p:fade/>
       </p:transition>
@@ -698,13 +703,13 @@
   <p:clrMapOvr>
     <a:masterClrMapping/>
   </p:clrMapOvr>
-  <mc:AlternateContent xmlns:mc="http://schemas.openxmlformats.org/markup-compatibility/2006">
-    <mc:Choice xmlns:p14="http://schemas.microsoft.com/office/powerpoint/2010/main" Requires="p14">
+  <mc:AlternateContent xmlns:mc="http://schemas.openxmlformats.org/markup-compatibility/2006" xmlns:p14="http://schemas.microsoft.com/office/powerpoint/2010/main">
+    <mc:Choice Requires="p14">
       <p:transition spd="med" p14:dur="700">
         <p:fade/>
       </p:transition>
     </mc:Choice>
-    <mc:Fallback>
+    <mc:Fallback xmlns="">
       <p:transition spd="med">
         <p:fade/>
       </p:transition>
@@ -971,13 +976,13 @@
   <p:clrMapOvr>
     <a:masterClrMapping/>
   </p:clrMapOvr>
-  <mc:AlternateContent xmlns:mc="http://schemas.openxmlformats.org/markup-compatibility/2006">
-    <mc:Choice xmlns:p14="http://schemas.microsoft.com/office/powerpoint/2010/main" Requires="p14">
+  <mc:AlternateContent xmlns:mc="http://schemas.openxmlformats.org/markup-compatibility/2006" xmlns:p14="http://schemas.microsoft.com/office/powerpoint/2010/main">
+    <mc:Choice Requires="p14">
       <p:transition spd="med" p14:dur="700">
         <p:fade/>
       </p:transition>
     </mc:Choice>
-    <mc:Fallback>
+    <mc:Fallback xmlns="">
       <p:transition spd="med">
         <p:fade/>
       </p:transition>
@@ -1459,13 +1464,13 @@
   <p:clrMapOvr>
     <a:masterClrMapping/>
   </p:clrMapOvr>
-  <mc:AlternateContent xmlns:mc="http://schemas.openxmlformats.org/markup-compatibility/2006">
-    <mc:Choice xmlns:p14="http://schemas.microsoft.com/office/powerpoint/2010/main" Requires="p14">
+  <mc:AlternateContent xmlns:mc="http://schemas.openxmlformats.org/markup-compatibility/2006" xmlns:p14="http://schemas.microsoft.com/office/powerpoint/2010/main">
+    <mc:Choice Requires="p14">
       <p:transition spd="med" p14:dur="700">
         <p:fade/>
       </p:transition>
     </mc:Choice>
-    <mc:Fallback>
+    <mc:Fallback xmlns="">
       <p:transition spd="med">
         <p:fade/>
       </p:transition>
@@ -1653,13 +1658,13 @@
   <p:clrMapOvr>
     <a:masterClrMapping/>
   </p:clrMapOvr>
-  <mc:AlternateContent xmlns:mc="http://schemas.openxmlformats.org/markup-compatibility/2006">
-    <mc:Choice xmlns:p14="http://schemas.microsoft.com/office/powerpoint/2010/main" Requires="p14">
+  <mc:AlternateContent xmlns:mc="http://schemas.openxmlformats.org/markup-compatibility/2006" xmlns:p14="http://schemas.microsoft.com/office/powerpoint/2010/main">
+    <mc:Choice Requires="p14">
       <p:transition spd="med" p14:dur="700">
         <p:fade/>
       </p:transition>
     </mc:Choice>
-    <mc:Fallback>
+    <mc:Fallback xmlns="">
       <p:transition spd="med">
         <p:fade/>
       </p:transition>
@@ -2248,13 +2253,13 @@
   <p:clrMapOvr>
     <a:masterClrMapping/>
   </p:clrMapOvr>
-  <mc:AlternateContent xmlns:mc="http://schemas.openxmlformats.org/markup-compatibility/2006">
-    <mc:Choice xmlns:p14="http://schemas.microsoft.com/office/powerpoint/2010/main" Requires="p14">
+  <mc:AlternateContent xmlns:mc="http://schemas.openxmlformats.org/markup-compatibility/2006" xmlns:p14="http://schemas.microsoft.com/office/powerpoint/2010/main">
+    <mc:Choice Requires="p14">
       <p:transition spd="med" p14:dur="700">
         <p:fade/>
       </p:transition>
     </mc:Choice>
-    <mc:Fallback>
+    <mc:Fallback xmlns="">
       <p:transition spd="med">
         <p:fade/>
       </p:transition>
@@ -2599,13 +2604,13 @@
   <p:clrMapOvr>
     <a:masterClrMapping/>
   </p:clrMapOvr>
-  <mc:AlternateContent xmlns:mc="http://schemas.openxmlformats.org/markup-compatibility/2006">
-    <mc:Choice xmlns:p14="http://schemas.microsoft.com/office/powerpoint/2010/main" Requires="p14">
+  <mc:AlternateContent xmlns:mc="http://schemas.openxmlformats.org/markup-compatibility/2006" xmlns:p14="http://schemas.microsoft.com/office/powerpoint/2010/main">
+    <mc:Choice Requires="p14">
       <p:transition spd="med" p14:dur="700">
         <p:fade/>
       </p:transition>
     </mc:Choice>
-    <mc:Fallback>
+    <mc:Fallback xmlns="">
       <p:transition spd="med">
         <p:fade/>
       </p:transition>
@@ -2759,13 +2764,13 @@
   <p:clrMapOvr>
     <a:masterClrMapping/>
   </p:clrMapOvr>
-  <mc:AlternateContent xmlns:mc="http://schemas.openxmlformats.org/markup-compatibility/2006">
-    <mc:Choice xmlns:p14="http://schemas.microsoft.com/office/powerpoint/2010/main" Requires="p14">
+  <mc:AlternateContent xmlns:mc="http://schemas.openxmlformats.org/markup-compatibility/2006" xmlns:p14="http://schemas.microsoft.com/office/powerpoint/2010/main">
+    <mc:Choice Requires="p14">
       <p:transition spd="med" p14:dur="700">
         <p:fade/>
       </p:transition>
     </mc:Choice>
-    <mc:Fallback>
+    <mc:Fallback xmlns="">
       <p:transition spd="med">
         <p:fade/>
       </p:transition>
@@ -2924,13 +2929,13 @@
   <p:clrMapOvr>
     <a:masterClrMapping/>
   </p:clrMapOvr>
-  <mc:AlternateContent xmlns:mc="http://schemas.openxmlformats.org/markup-compatibility/2006">
-    <mc:Choice xmlns:p14="http://schemas.microsoft.com/office/powerpoint/2010/main" Requires="p14">
+  <mc:AlternateContent xmlns:mc="http://schemas.openxmlformats.org/markup-compatibility/2006" xmlns:p14="http://schemas.microsoft.com/office/powerpoint/2010/main">
+    <mc:Choice Requires="p14">
       <p:transition spd="med" p14:dur="700">
         <p:fade/>
       </p:transition>
     </mc:Choice>
-    <mc:Fallback>
+    <mc:Fallback xmlns="">
       <p:transition spd="med">
         <p:fade/>
       </p:transition>
@@ -3079,13 +3084,13 @@
   <p:clrMapOvr>
     <a:masterClrMapping/>
   </p:clrMapOvr>
-  <mc:AlternateContent xmlns:mc="http://schemas.openxmlformats.org/markup-compatibility/2006">
-    <mc:Choice xmlns:p14="http://schemas.microsoft.com/office/powerpoint/2010/main" Requires="p14">
+  <mc:AlternateContent xmlns:mc="http://schemas.openxmlformats.org/markup-compatibility/2006" xmlns:p14="http://schemas.microsoft.com/office/powerpoint/2010/main">
+    <mc:Choice Requires="p14">
       <p:transition spd="med" p14:dur="700">
         <p:fade/>
       </p:transition>
     </mc:Choice>
-    <mc:Fallback>
+    <mc:Fallback xmlns="">
       <p:transition spd="med">
         <p:fade/>
       </p:transition>
@@ -3350,13 +3355,13 @@
   <p:clrMapOvr>
     <a:masterClrMapping/>
   </p:clrMapOvr>
-  <mc:AlternateContent xmlns:mc="http://schemas.openxmlformats.org/markup-compatibility/2006">
-    <mc:Choice xmlns:p14="http://schemas.microsoft.com/office/powerpoint/2010/main" Requires="p14">
+  <mc:AlternateContent xmlns:mc="http://schemas.openxmlformats.org/markup-compatibility/2006" xmlns:p14="http://schemas.microsoft.com/office/powerpoint/2010/main">
+    <mc:Choice Requires="p14">
       <p:transition spd="med" p14:dur="700">
         <p:fade/>
       </p:transition>
     </mc:Choice>
-    <mc:Fallback>
+    <mc:Fallback xmlns="">
       <p:transition spd="med">
         <p:fade/>
       </p:transition>
@@ -3603,13 +3608,13 @@
   <p:clrMapOvr>
     <a:masterClrMapping/>
   </p:clrMapOvr>
-  <mc:AlternateContent xmlns:mc="http://schemas.openxmlformats.org/markup-compatibility/2006">
-    <mc:Choice xmlns:p14="http://schemas.microsoft.com/office/powerpoint/2010/main" Requires="p14">
+  <mc:AlternateContent xmlns:mc="http://schemas.openxmlformats.org/markup-compatibility/2006" xmlns:p14="http://schemas.microsoft.com/office/powerpoint/2010/main">
+    <mc:Choice Requires="p14">
       <p:transition spd="med" p14:dur="700">
         <p:fade/>
       </p:transition>
     </mc:Choice>
-    <mc:Fallback>
+    <mc:Fallback xmlns="">
       <p:transition spd="med">
         <p:fade/>
       </p:transition>
@@ -4004,13 +4009,13 @@
   <p:clrMapOvr>
     <a:masterClrMapping/>
   </p:clrMapOvr>
-  <mc:AlternateContent xmlns:mc="http://schemas.openxmlformats.org/markup-compatibility/2006">
-    <mc:Choice xmlns:p14="http://schemas.microsoft.com/office/powerpoint/2010/main" Requires="p14">
+  <mc:AlternateContent xmlns:mc="http://schemas.openxmlformats.org/markup-compatibility/2006" xmlns:p14="http://schemas.microsoft.com/office/powerpoint/2010/main">
+    <mc:Choice Requires="p14">
       <p:transition spd="med" p14:dur="700">
         <p:fade/>
       </p:transition>
     </mc:Choice>
-    <mc:Fallback>
+    <mc:Fallback xmlns="">
       <p:transition spd="med">
         <p:fade/>
       </p:transition>
@@ -4131,13 +4136,13 @@
   <p:clrMapOvr>
     <a:masterClrMapping/>
   </p:clrMapOvr>
-  <mc:AlternateContent xmlns:mc="http://schemas.openxmlformats.org/markup-compatibility/2006">
-    <mc:Choice xmlns:p14="http://schemas.microsoft.com/office/powerpoint/2010/main" Requires="p14">
+  <mc:AlternateContent xmlns:mc="http://schemas.openxmlformats.org/markup-compatibility/2006" xmlns:p14="http://schemas.microsoft.com/office/powerpoint/2010/main">
+    <mc:Choice Requires="p14">
       <p:transition spd="med" p14:dur="700">
         <p:fade/>
       </p:transition>
     </mc:Choice>
-    <mc:Fallback>
+    <mc:Fallback xmlns="">
       <p:transition spd="med">
         <p:fade/>
       </p:transition>
@@ -4235,13 +4240,13 @@
   <p:clrMapOvr>
     <a:masterClrMapping/>
   </p:clrMapOvr>
-  <mc:AlternateContent xmlns:mc="http://schemas.openxmlformats.org/markup-compatibility/2006">
-    <mc:Choice xmlns:p14="http://schemas.microsoft.com/office/powerpoint/2010/main" Requires="p14">
+  <mc:AlternateContent xmlns:mc="http://schemas.openxmlformats.org/markup-compatibility/2006" xmlns:p14="http://schemas.microsoft.com/office/powerpoint/2010/main">
+    <mc:Choice Requires="p14">
       <p:transition spd="med" p14:dur="700">
         <p:fade/>
       </p:transition>
     </mc:Choice>
-    <mc:Fallback>
+    <mc:Fallback xmlns="">
       <p:transition spd="med">
         <p:fade/>
       </p:transition>
@@ -4508,13 +4513,13 @@
   <p:clrMapOvr>
     <a:masterClrMapping/>
   </p:clrMapOvr>
-  <mc:AlternateContent xmlns:mc="http://schemas.openxmlformats.org/markup-compatibility/2006">
-    <mc:Choice xmlns:p14="http://schemas.microsoft.com/office/powerpoint/2010/main" Requires="p14">
+  <mc:AlternateContent xmlns:mc="http://schemas.openxmlformats.org/markup-compatibility/2006" xmlns:p14="http://schemas.microsoft.com/office/powerpoint/2010/main">
+    <mc:Choice Requires="p14">
       <p:transition spd="med" p14:dur="700">
         <p:fade/>
       </p:transition>
     </mc:Choice>
-    <mc:Fallback>
+    <mc:Fallback xmlns="">
       <p:transition spd="med">
         <p:fade/>
       </p:transition>
@@ -4823,13 +4828,13 @@
   <p:clrMapOvr>
     <a:masterClrMapping/>
   </p:clrMapOvr>
-  <mc:AlternateContent xmlns:mc="http://schemas.openxmlformats.org/markup-compatibility/2006">
-    <mc:Choice xmlns:p14="http://schemas.microsoft.com/office/powerpoint/2010/main" Requires="p14">
+  <mc:AlternateContent xmlns:mc="http://schemas.openxmlformats.org/markup-compatibility/2006" xmlns:p14="http://schemas.microsoft.com/office/powerpoint/2010/main">
+    <mc:Choice Requires="p14">
       <p:transition spd="med" p14:dur="700">
         <p:fade/>
       </p:transition>
     </mc:Choice>
-    <mc:Fallback>
+    <mc:Fallback xmlns="">
       <p:transition spd="med">
         <p:fade/>
       </p:transition>
@@ -5098,13 +5103,13 @@
     <p:sldLayoutId id="2147483658" r:id="rId16"/>
     <p:sldLayoutId id="2147483659" r:id="rId17"/>
   </p:sldLayoutIdLst>
-  <mc:AlternateContent xmlns:mc="http://schemas.openxmlformats.org/markup-compatibility/2006">
-    <mc:Choice xmlns:p14="http://schemas.microsoft.com/office/powerpoint/2010/main" Requires="p14">
+  <mc:AlternateContent xmlns:mc="http://schemas.openxmlformats.org/markup-compatibility/2006" xmlns:p14="http://schemas.microsoft.com/office/powerpoint/2010/main">
+    <mc:Choice Requires="p14">
       <p:transition spd="med" p14:dur="700">
         <p:fade/>
       </p:transition>
     </mc:Choice>
-    <mc:Fallback>
+    <mc:Fallback xmlns="">
       <p:transition spd="med">
         <p:fade/>
       </p:transition>
@@ -5828,13 +5833,13 @@
   <p:clrMapOvr>
     <a:masterClrMapping/>
   </p:clrMapOvr>
-  <mc:AlternateContent xmlns:mc="http://schemas.openxmlformats.org/markup-compatibility/2006">
-    <mc:Choice xmlns:p14="http://schemas.microsoft.com/office/powerpoint/2010/main" Requires="p14">
+  <mc:AlternateContent xmlns:mc="http://schemas.openxmlformats.org/markup-compatibility/2006" xmlns:p14="http://schemas.microsoft.com/office/powerpoint/2010/main">
+    <mc:Choice Requires="p14">
       <p:transition spd="med" p14:dur="700">
         <p:fade/>
       </p:transition>
     </mc:Choice>
-    <mc:Fallback>
+    <mc:Fallback xmlns="">
       <p:transition spd="med">
         <p:fade/>
       </p:transition>
@@ -7565,13 +7570,13 @@
   <p:clrMapOvr>
     <a:masterClrMapping/>
   </p:clrMapOvr>
-  <mc:AlternateContent xmlns:mc="http://schemas.openxmlformats.org/markup-compatibility/2006">
-    <mc:Choice xmlns:p14="http://schemas.microsoft.com/office/powerpoint/2010/main" Requires="p14">
+  <mc:AlternateContent xmlns:mc="http://schemas.openxmlformats.org/markup-compatibility/2006" xmlns:p14="http://schemas.microsoft.com/office/powerpoint/2010/main">
+    <mc:Choice Requires="p14">
       <p:transition spd="med" p14:dur="700">
         <p:fade/>
       </p:transition>
     </mc:Choice>
-    <mc:Fallback>
+    <mc:Fallback xmlns="">
       <p:transition spd="med">
         <p:fade/>
       </p:transition>
@@ -9422,13 +9427,13 @@
   <p:clrMapOvr>
     <a:masterClrMapping/>
   </p:clrMapOvr>
-  <mc:AlternateContent xmlns:mc="http://schemas.openxmlformats.org/markup-compatibility/2006">
-    <mc:Choice xmlns:p14="http://schemas.microsoft.com/office/powerpoint/2010/main" Requires="p14">
+  <mc:AlternateContent xmlns:mc="http://schemas.openxmlformats.org/markup-compatibility/2006" xmlns:p14="http://schemas.microsoft.com/office/powerpoint/2010/main">
+    <mc:Choice Requires="p14">
       <p:transition spd="med" p14:dur="700">
         <p:fade/>
       </p:transition>
     </mc:Choice>
-    <mc:Fallback>
+    <mc:Fallback xmlns="">
       <p:transition spd="med">
         <p:fade/>
       </p:transition>
@@ -11417,13 +11422,13 @@
   <p:clrMapOvr>
     <a:masterClrMapping/>
   </p:clrMapOvr>
-  <mc:AlternateContent xmlns:mc="http://schemas.openxmlformats.org/markup-compatibility/2006">
-    <mc:Choice xmlns:p14="http://schemas.microsoft.com/office/powerpoint/2010/main" Requires="p14">
+  <mc:AlternateContent xmlns:mc="http://schemas.openxmlformats.org/markup-compatibility/2006" xmlns:p14="http://schemas.microsoft.com/office/powerpoint/2010/main">
+    <mc:Choice Requires="p14">
       <p:transition spd="med" p14:dur="700">
         <p:fade/>
       </p:transition>
     </mc:Choice>
-    <mc:Fallback>
+    <mc:Fallback xmlns="">
       <p:transition spd="med">
         <p:fade/>
       </p:transition>
@@ -13086,13 +13091,13 @@
   <p:clrMapOvr>
     <a:masterClrMapping/>
   </p:clrMapOvr>
-  <mc:AlternateContent xmlns:mc="http://schemas.openxmlformats.org/markup-compatibility/2006">
-    <mc:Choice xmlns:p14="http://schemas.microsoft.com/office/powerpoint/2010/main" Requires="p14">
+  <mc:AlternateContent xmlns:mc="http://schemas.openxmlformats.org/markup-compatibility/2006" xmlns:p14="http://schemas.microsoft.com/office/powerpoint/2010/main">
+    <mc:Choice Requires="p14">
       <p:transition spd="med" p14:dur="700">
         <p:fade/>
       </p:transition>
     </mc:Choice>
-    <mc:Fallback>
+    <mc:Fallback xmlns="">
       <p:transition spd="med">
         <p:fade/>
       </p:transition>
@@ -13560,14 +13565,6 @@
             </a:r>
             <a:r>
               <a:rPr lang="de-DE" dirty="0"/>
-              <a:t> </a:t>
-            </a:r>
-            <a:r>
-              <a:rPr lang="de-DE" dirty="0" err="1"/>
-              <a:t>around</a:t>
-            </a:r>
-            <a:r>
-              <a:rPr lang="de-DE" dirty="0"/>
               <a:t> an </a:t>
             </a:r>
             <a:r>
@@ -13638,13 +13635,13 @@
   <p:clrMapOvr>
     <a:masterClrMapping/>
   </p:clrMapOvr>
-  <mc:AlternateContent xmlns:mc="http://schemas.openxmlformats.org/markup-compatibility/2006">
-    <mc:Choice xmlns:p14="http://schemas.microsoft.com/office/powerpoint/2010/main" Requires="p14">
+  <mc:AlternateContent xmlns:mc="http://schemas.openxmlformats.org/markup-compatibility/2006" xmlns:p14="http://schemas.microsoft.com/office/powerpoint/2010/main">
+    <mc:Choice Requires="p14">
       <p:transition spd="med" p14:dur="700">
         <p:fade/>
       </p:transition>
     </mc:Choice>
-    <mc:Fallback>
+    <mc:Fallback xmlns="">
       <p:transition spd="med">
         <p:fade/>
       </p:transition>
@@ -14509,13 +14506,13 @@
   <p:clrMapOvr>
     <a:masterClrMapping/>
   </p:clrMapOvr>
-  <mc:AlternateContent xmlns:mc="http://schemas.openxmlformats.org/markup-compatibility/2006">
-    <mc:Choice xmlns:p14="http://schemas.microsoft.com/office/powerpoint/2010/main" Requires="p14">
+  <mc:AlternateContent xmlns:mc="http://schemas.openxmlformats.org/markup-compatibility/2006" xmlns:p14="http://schemas.microsoft.com/office/powerpoint/2010/main">
+    <mc:Choice Requires="p14">
       <p:transition spd="med" p14:dur="700">
         <p:fade/>
       </p:transition>
     </mc:Choice>
-    <mc:Fallback>
+    <mc:Fallback xmlns="">
       <p:transition spd="med">
         <p:fade/>
       </p:transition>
@@ -15093,13 +15090,13 @@
   <p:clrMapOvr>
     <a:masterClrMapping/>
   </p:clrMapOvr>
-  <mc:AlternateContent xmlns:mc="http://schemas.openxmlformats.org/markup-compatibility/2006">
-    <mc:Choice xmlns:p14="http://schemas.microsoft.com/office/powerpoint/2010/main" Requires="p14">
+  <mc:AlternateContent xmlns:mc="http://schemas.openxmlformats.org/markup-compatibility/2006" xmlns:p14="http://schemas.microsoft.com/office/powerpoint/2010/main">
+    <mc:Choice Requires="p14">
       <p:transition spd="med" p14:dur="700">
         <p:fade/>
       </p:transition>
     </mc:Choice>
-    <mc:Fallback>
+    <mc:Fallback xmlns="">
       <p:transition spd="med">
         <p:fade/>
       </p:transition>
@@ -16393,13 +16390,13 @@
   <p:clrMapOvr>
     <a:masterClrMapping/>
   </p:clrMapOvr>
-  <mc:AlternateContent xmlns:mc="http://schemas.openxmlformats.org/markup-compatibility/2006">
-    <mc:Choice xmlns:p14="http://schemas.microsoft.com/office/powerpoint/2010/main" Requires="p14">
+  <mc:AlternateContent xmlns:mc="http://schemas.openxmlformats.org/markup-compatibility/2006" xmlns:p14="http://schemas.microsoft.com/office/powerpoint/2010/main">
+    <mc:Choice Requires="p14">
       <p:transition spd="med" p14:dur="700">
         <p:fade/>
       </p:transition>
     </mc:Choice>
-    <mc:Fallback>
+    <mc:Fallback xmlns="">
       <p:transition spd="med">
         <p:fade/>
       </p:transition>
@@ -16472,8 +16469,8 @@
         </p:nvSpPr>
         <p:spPr>
           <a:xfrm>
-            <a:off x="1635499" y="2188965"/>
-            <a:ext cx="9033242" cy="4308872"/>
+            <a:off x="1624639" y="2188965"/>
+            <a:ext cx="9422772" cy="4308872"/>
           </a:xfrm>
           <a:prstGeom prst="rect">
             <a:avLst/>
@@ -16512,7 +16509,7 @@
             </a:r>
             <a:r>
               <a:rPr lang="de-DE" dirty="0"/>
-              <a:t> but </a:t>
+              <a:t> but also </a:t>
             </a:r>
             <a:r>
               <a:rPr lang="de-DE" dirty="0" err="1"/>
@@ -16520,7 +16517,7 @@
             </a:r>
             <a:r>
               <a:rPr lang="de-DE" dirty="0"/>
-              <a:t> also Spring Boot Features like</a:t>
+              <a:t> Spring Boot Features like</a:t>
             </a:r>
           </a:p>
           <a:p>
@@ -16686,24 +16683,8 @@
               <a:buChar char="•"/>
             </a:pPr>
             <a:r>
-              <a:rPr lang="de-DE" dirty="0" err="1"/>
-              <a:t>Initializes</a:t>
-            </a:r>
-            <a:r>
-              <a:rPr lang="de-DE" dirty="0"/>
-              <a:t> </a:t>
-            </a:r>
-            <a:r>
-              <a:rPr lang="de-DE" dirty="0" err="1"/>
-              <a:t>by</a:t>
-            </a:r>
-            <a:r>
-              <a:rPr lang="de-DE" dirty="0"/>
-              <a:t> Default </a:t>
-            </a:r>
-            <a:r>
               <a:rPr lang="de-DE" u="sng" dirty="0"/>
-              <a:t>all </a:t>
+              <a:t>All </a:t>
             </a:r>
             <a:r>
               <a:rPr lang="de-DE" u="sng" dirty="0" err="1"/>
@@ -16719,6 +16700,50 @@
             </a:r>
             <a:r>
               <a:rPr lang="de-DE" u="sng" dirty="0"/>
+              <a:t> </a:t>
+            </a:r>
+            <a:r>
+              <a:rPr lang="de-DE" u="sng" dirty="0" err="1"/>
+              <a:t>are</a:t>
+            </a:r>
+            <a:r>
+              <a:rPr lang="de-DE" u="sng" dirty="0"/>
+              <a:t> </a:t>
+            </a:r>
+            <a:r>
+              <a:rPr lang="de-DE" u="sng" dirty="0" err="1"/>
+              <a:t>used</a:t>
+            </a:r>
+            <a:r>
+              <a:rPr lang="de-DE" u="sng" dirty="0"/>
+              <a:t> </a:t>
+            </a:r>
+            <a:r>
+              <a:rPr lang="de-DE" u="sng" dirty="0" err="1"/>
+              <a:t>by</a:t>
+            </a:r>
+            <a:r>
+              <a:rPr lang="de-DE" u="sng" dirty="0"/>
+              <a:t> </a:t>
+            </a:r>
+            <a:r>
+              <a:rPr lang="de-DE" u="sng" dirty="0">
+                <a:solidFill>
+                  <a:srgbClr val="FFFF00"/>
+                </a:solidFill>
+              </a:rPr>
+              <a:t>@</a:t>
+            </a:r>
+            <a:r>
+              <a:rPr lang="de-DE" u="sng" dirty="0" err="1">
+                <a:solidFill>
+                  <a:srgbClr val="FFFF00"/>
+                </a:solidFill>
+              </a:rPr>
+              <a:t>SpringBootApplication</a:t>
+            </a:r>
+            <a:r>
+              <a:rPr lang="de-DE" u="sng" dirty="0"/>
               <a:t> will </a:t>
             </a:r>
             <a:r>
@@ -16731,7 +16756,7 @@
             </a:r>
             <a:r>
               <a:rPr lang="de-DE" u="sng" dirty="0" err="1"/>
-              <a:t>used</a:t>
+              <a:t>initialized</a:t>
             </a:r>
             <a:r>
               <a:rPr lang="de-DE" u="sng" dirty="0"/>
@@ -16746,20 +16771,16 @@
               <a:t> </a:t>
             </a:r>
             <a:r>
+              <a:rPr lang="de-DE" u="sng" dirty="0" err="1"/>
+              <a:t>default</a:t>
+            </a:r>
+            <a:r>
               <a:rPr lang="de-DE" u="sng" dirty="0">
                 <a:solidFill>
                   <a:srgbClr val="FFFF00"/>
                 </a:solidFill>
               </a:rPr>
-              <a:t>@</a:t>
-            </a:r>
-            <a:r>
-              <a:rPr lang="de-DE" u="sng" dirty="0" err="1">
-                <a:solidFill>
-                  <a:srgbClr val="FFFF00"/>
-                </a:solidFill>
-              </a:rPr>
-              <a:t>SpringBootApplication</a:t>
+              <a:t>.</a:t>
             </a:r>
             <a:br>
               <a:rPr lang="de-DE" dirty="0"/>
@@ -17069,8 +17090,12 @@
               <a:t>used</a:t>
             </a:r>
             <a:r>
-              <a:rPr lang="de-DE"/>
-              <a:t> to</a:t>
+              <a:rPr lang="de-DE" dirty="0"/>
+              <a:t> </a:t>
+            </a:r>
+            <a:r>
+              <a:rPr lang="de-DE" dirty="0" err="1"/>
+              <a:t>to</a:t>
             </a:r>
             <a:r>
               <a:rPr lang="de-DE" dirty="0"/>
@@ -17145,13 +17170,13 @@
   <p:clrMapOvr>
     <a:masterClrMapping/>
   </p:clrMapOvr>
-  <mc:AlternateContent xmlns:mc="http://schemas.openxmlformats.org/markup-compatibility/2006">
-    <mc:Choice xmlns:p14="http://schemas.microsoft.com/office/powerpoint/2010/main" Requires="p14">
+  <mc:AlternateContent xmlns:mc="http://schemas.openxmlformats.org/markup-compatibility/2006" xmlns:p14="http://schemas.microsoft.com/office/powerpoint/2010/main">
+    <mc:Choice Requires="p14">
       <p:transition spd="med" p14:dur="700">
         <p:fade/>
       </p:transition>
     </mc:Choice>
-    <mc:Fallback>
+    <mc:Fallback xmlns="">
       <p:transition spd="med">
         <p:fade/>
       </p:transition>
@@ -18184,13 +18209,13 @@
   <p:clrMapOvr>
     <a:masterClrMapping/>
   </p:clrMapOvr>
-  <mc:AlternateContent xmlns:mc="http://schemas.openxmlformats.org/markup-compatibility/2006">
-    <mc:Choice xmlns:p14="http://schemas.microsoft.com/office/powerpoint/2010/main" Requires="p14">
+  <mc:AlternateContent xmlns:mc="http://schemas.openxmlformats.org/markup-compatibility/2006" xmlns:p14="http://schemas.microsoft.com/office/powerpoint/2010/main">
+    <mc:Choice Requires="p14">
       <p:transition spd="med" p14:dur="700">
         <p:fade/>
       </p:transition>
     </mc:Choice>
-    <mc:Fallback>
+    <mc:Fallback xmlns="">
       <p:transition spd="med">
         <p:fade/>
       </p:transition>
@@ -19830,13 +19855,13 @@
   <p:clrMapOvr>
     <a:masterClrMapping/>
   </p:clrMapOvr>
-  <mc:AlternateContent xmlns:mc="http://schemas.openxmlformats.org/markup-compatibility/2006">
-    <mc:Choice xmlns:p14="http://schemas.microsoft.com/office/powerpoint/2010/main" Requires="p14">
+  <mc:AlternateContent xmlns:mc="http://schemas.openxmlformats.org/markup-compatibility/2006" xmlns:p14="http://schemas.microsoft.com/office/powerpoint/2010/main">
+    <mc:Choice Requires="p14">
       <p:transition spd="med" p14:dur="700">
         <p:fade/>
       </p:transition>
     </mc:Choice>
-    <mc:Fallback>
+    <mc:Fallback xmlns="">
       <p:transition spd="med">
         <p:fade/>
       </p:transition>
@@ -20211,13 +20236,13 @@
   <p:clrMapOvr>
     <a:masterClrMapping/>
   </p:clrMapOvr>
-  <mc:AlternateContent xmlns:mc="http://schemas.openxmlformats.org/markup-compatibility/2006">
-    <mc:Choice xmlns:p14="http://schemas.microsoft.com/office/powerpoint/2010/main" Requires="p14">
+  <mc:AlternateContent xmlns:mc="http://schemas.openxmlformats.org/markup-compatibility/2006" xmlns:p14="http://schemas.microsoft.com/office/powerpoint/2010/main">
+    <mc:Choice Requires="p14">
       <p:transition spd="med" p14:dur="700">
         <p:fade/>
       </p:transition>
     </mc:Choice>
-    <mc:Fallback>
+    <mc:Fallback xmlns="">
       <p:transition spd="med">
         <p:fade/>
       </p:transition>
@@ -21134,13 +21159,13 @@
   <p:clrMapOvr>
     <a:masterClrMapping/>
   </p:clrMapOvr>
-  <mc:AlternateContent xmlns:mc="http://schemas.openxmlformats.org/markup-compatibility/2006">
-    <mc:Choice xmlns:p14="http://schemas.microsoft.com/office/powerpoint/2010/main" Requires="p14">
+  <mc:AlternateContent xmlns:mc="http://schemas.openxmlformats.org/markup-compatibility/2006" xmlns:p14="http://schemas.microsoft.com/office/powerpoint/2010/main">
+    <mc:Choice Requires="p14">
       <p:transition spd="med" p14:dur="700">
         <p:fade/>
       </p:transition>
     </mc:Choice>
-    <mc:Fallback>
+    <mc:Fallback xmlns="">
       <p:transition spd="med">
         <p:fade/>
       </p:transition>
@@ -22258,13 +22283,13 @@
   <p:clrMapOvr>
     <a:masterClrMapping/>
   </p:clrMapOvr>
-  <mc:AlternateContent xmlns:mc="http://schemas.openxmlformats.org/markup-compatibility/2006">
-    <mc:Choice xmlns:p14="http://schemas.microsoft.com/office/powerpoint/2010/main" Requires="p14">
+  <mc:AlternateContent xmlns:mc="http://schemas.openxmlformats.org/markup-compatibility/2006" xmlns:p14="http://schemas.microsoft.com/office/powerpoint/2010/main">
+    <mc:Choice Requires="p14">
       <p:transition spd="med" p14:dur="700">
         <p:fade/>
       </p:transition>
     </mc:Choice>
-    <mc:Fallback>
+    <mc:Fallback xmlns="">
       <p:transition spd="med">
         <p:fade/>
       </p:transition>
@@ -24143,13 +24168,13 @@
   <p:clrMapOvr>
     <a:masterClrMapping/>
   </p:clrMapOvr>
-  <mc:AlternateContent xmlns:mc="http://schemas.openxmlformats.org/markup-compatibility/2006">
-    <mc:Choice xmlns:p14="http://schemas.microsoft.com/office/powerpoint/2010/main" Requires="p14">
+  <mc:AlternateContent xmlns:mc="http://schemas.openxmlformats.org/markup-compatibility/2006" xmlns:p14="http://schemas.microsoft.com/office/powerpoint/2010/main">
+    <mc:Choice Requires="p14">
       <p:transition spd="med" p14:dur="700">
         <p:fade/>
       </p:transition>
     </mc:Choice>
-    <mc:Fallback>
+    <mc:Fallback xmlns="">
       <p:transition spd="med">
         <p:fade/>
       </p:transition>
@@ -25280,13 +25305,13 @@
   <p:clrMapOvr>
     <a:masterClrMapping/>
   </p:clrMapOvr>
-  <mc:AlternateContent xmlns:mc="http://schemas.openxmlformats.org/markup-compatibility/2006">
-    <mc:Choice xmlns:p14="http://schemas.microsoft.com/office/powerpoint/2010/main" Requires="p14">
+  <mc:AlternateContent xmlns:mc="http://schemas.openxmlformats.org/markup-compatibility/2006" xmlns:p14="http://schemas.microsoft.com/office/powerpoint/2010/main">
+    <mc:Choice Requires="p14">
       <p:transition spd="med" p14:dur="700">
         <p:fade/>
       </p:transition>
     </mc:Choice>
-    <mc:Fallback>
+    <mc:Fallback xmlns="">
       <p:transition spd="med">
         <p:fade/>
       </p:transition>
@@ -25702,13 +25727,13 @@
   <p:clrMapOvr>
     <a:masterClrMapping/>
   </p:clrMapOvr>
-  <mc:AlternateContent xmlns:mc="http://schemas.openxmlformats.org/markup-compatibility/2006">
-    <mc:Choice xmlns:p14="http://schemas.microsoft.com/office/powerpoint/2010/main" Requires="p14">
+  <mc:AlternateContent xmlns:mc="http://schemas.openxmlformats.org/markup-compatibility/2006" xmlns:p14="http://schemas.microsoft.com/office/powerpoint/2010/main">
+    <mc:Choice Requires="p14">
       <p:transition spd="med" p14:dur="700">
         <p:fade/>
       </p:transition>
     </mc:Choice>
-    <mc:Fallback>
+    <mc:Fallback xmlns="">
       <p:transition spd="med">
         <p:fade/>
       </p:transition>
@@ -27135,13 +27160,13 @@
   <p:clrMapOvr>
     <a:masterClrMapping/>
   </p:clrMapOvr>
-  <mc:AlternateContent xmlns:mc="http://schemas.openxmlformats.org/markup-compatibility/2006">
-    <mc:Choice xmlns:p14="http://schemas.microsoft.com/office/powerpoint/2010/main" Requires="p14">
+  <mc:AlternateContent xmlns:mc="http://schemas.openxmlformats.org/markup-compatibility/2006" xmlns:p14="http://schemas.microsoft.com/office/powerpoint/2010/main">
+    <mc:Choice Requires="p14">
       <p:transition spd="med" p14:dur="700">
         <p:fade/>
       </p:transition>
     </mc:Choice>
-    <mc:Fallback>
+    <mc:Fallback xmlns="">
       <p:transition spd="med">
         <p:fade/>
       </p:transition>

</xml_diff>

<commit_message>
changed some content on the presentation
</commit_message>
<xml_diff>
--- a/meetup-presentation.pptx
+++ b/meetup-presentation.pptx
@@ -346,7 +346,7 @@
             <a:fld id="{B61BEF0D-F0BB-DE4B-95CE-6DB70DBA9567}" type="datetimeFigureOut">
               <a:rPr lang="en-US" dirty="0"/>
               <a:pPr/>
-              <a:t>1/20/19</a:t>
+              <a:t>1/21/19</a:t>
             </a:fld>
             <a:endParaRPr lang="en-US" dirty="0"/>
           </a:p>
@@ -651,7 +651,7 @@
             <a:fld id="{B61BEF0D-F0BB-DE4B-95CE-6DB70DBA9567}" type="datetimeFigureOut">
               <a:rPr lang="en-US" dirty="0"/>
               <a:pPr/>
-              <a:t>1/20/19</a:t>
+              <a:t>1/21/19</a:t>
             </a:fld>
             <a:endParaRPr lang="en-US" dirty="0"/>
           </a:p>
@@ -924,7 +924,7 @@
             <a:fld id="{B61BEF0D-F0BB-DE4B-95CE-6DB70DBA9567}" type="datetimeFigureOut">
               <a:rPr lang="en-US" dirty="0"/>
               <a:pPr/>
-              <a:t>1/20/19</a:t>
+              <a:t>1/21/19</a:t>
             </a:fld>
             <a:endParaRPr lang="en-US" dirty="0"/>
           </a:p>
@@ -1412,7 +1412,7 @@
             <a:fld id="{B61BEF0D-F0BB-DE4B-95CE-6DB70DBA9567}" type="datetimeFigureOut">
               <a:rPr lang="en-US" dirty="0"/>
               <a:pPr/>
-              <a:t>1/20/19</a:t>
+              <a:t>1/21/19</a:t>
             </a:fld>
             <a:endParaRPr lang="en-US" dirty="0"/>
           </a:p>
@@ -1606,7 +1606,7 @@
             <a:fld id="{B61BEF0D-F0BB-DE4B-95CE-6DB70DBA9567}" type="datetimeFigureOut">
               <a:rPr lang="en-US" dirty="0"/>
               <a:pPr/>
-              <a:t>1/20/19</a:t>
+              <a:t>1/21/19</a:t>
             </a:fld>
             <a:endParaRPr lang="en-US" dirty="0"/>
           </a:p>
@@ -2201,7 +2201,7 @@
             <a:fld id="{B61BEF0D-F0BB-DE4B-95CE-6DB70DBA9567}" type="datetimeFigureOut">
               <a:rPr lang="en-US" dirty="0"/>
               <a:pPr/>
-              <a:t>1/20/19</a:t>
+              <a:t>1/21/19</a:t>
             </a:fld>
             <a:endParaRPr lang="en-US" dirty="0"/>
           </a:p>
@@ -2552,7 +2552,7 @@
             <a:fld id="{B61BEF0D-F0BB-DE4B-95CE-6DB70DBA9567}" type="datetimeFigureOut">
               <a:rPr lang="en-US" dirty="0"/>
               <a:pPr/>
-              <a:t>1/20/19</a:t>
+              <a:t>1/21/19</a:t>
             </a:fld>
             <a:endParaRPr lang="en-US" dirty="0"/>
           </a:p>
@@ -2712,7 +2712,7 @@
             <a:fld id="{B61BEF0D-F0BB-DE4B-95CE-6DB70DBA9567}" type="datetimeFigureOut">
               <a:rPr lang="en-US" dirty="0"/>
               <a:pPr/>
-              <a:t>1/20/19</a:t>
+              <a:t>1/21/19</a:t>
             </a:fld>
             <a:endParaRPr lang="en-US" dirty="0"/>
           </a:p>
@@ -2877,7 +2877,7 @@
             <a:fld id="{B61BEF0D-F0BB-DE4B-95CE-6DB70DBA9567}" type="datetimeFigureOut">
               <a:rPr lang="en-US" dirty="0"/>
               <a:pPr/>
-              <a:t>1/20/19</a:t>
+              <a:t>1/21/19</a:t>
             </a:fld>
             <a:endParaRPr lang="en-US" dirty="0"/>
           </a:p>
@@ -3032,7 +3032,7 @@
             <a:fld id="{B61BEF0D-F0BB-DE4B-95CE-6DB70DBA9567}" type="datetimeFigureOut">
               <a:rPr lang="en-US" dirty="0"/>
               <a:pPr/>
-              <a:t>1/20/19</a:t>
+              <a:t>1/21/19</a:t>
             </a:fld>
             <a:endParaRPr lang="en-US" dirty="0"/>
           </a:p>
@@ -3303,7 +3303,7 @@
             <a:fld id="{B61BEF0D-F0BB-DE4B-95CE-6DB70DBA9567}" type="datetimeFigureOut">
               <a:rPr lang="en-US" dirty="0"/>
               <a:pPr/>
-              <a:t>1/20/19</a:t>
+              <a:t>1/21/19</a:t>
             </a:fld>
             <a:endParaRPr lang="en-US" dirty="0"/>
           </a:p>
@@ -3556,7 +3556,7 @@
             <a:fld id="{B61BEF0D-F0BB-DE4B-95CE-6DB70DBA9567}" type="datetimeFigureOut">
               <a:rPr lang="en-US" dirty="0"/>
               <a:pPr/>
-              <a:t>1/20/19</a:t>
+              <a:t>1/21/19</a:t>
             </a:fld>
             <a:endParaRPr lang="en-US" dirty="0"/>
           </a:p>
@@ -3957,7 +3957,7 @@
             <a:fld id="{B61BEF0D-F0BB-DE4B-95CE-6DB70DBA9567}" type="datetimeFigureOut">
               <a:rPr lang="en-US" dirty="0"/>
               <a:pPr/>
-              <a:t>1/20/19</a:t>
+              <a:t>1/21/19</a:t>
             </a:fld>
             <a:endParaRPr lang="en-US" dirty="0"/>
           </a:p>
@@ -4084,7 +4084,7 @@
             <a:fld id="{B61BEF0D-F0BB-DE4B-95CE-6DB70DBA9567}" type="datetimeFigureOut">
               <a:rPr lang="en-US" dirty="0"/>
               <a:pPr/>
-              <a:t>1/20/19</a:t>
+              <a:t>1/21/19</a:t>
             </a:fld>
             <a:endParaRPr lang="en-US" dirty="0"/>
           </a:p>
@@ -4188,7 +4188,7 @@
             <a:fld id="{B61BEF0D-F0BB-DE4B-95CE-6DB70DBA9567}" type="datetimeFigureOut">
               <a:rPr lang="en-US" dirty="0"/>
               <a:pPr/>
-              <a:t>1/20/19</a:t>
+              <a:t>1/21/19</a:t>
             </a:fld>
             <a:endParaRPr lang="en-US" dirty="0"/>
           </a:p>
@@ -4461,7 +4461,7 @@
             <a:fld id="{B61BEF0D-F0BB-DE4B-95CE-6DB70DBA9567}" type="datetimeFigureOut">
               <a:rPr lang="en-US" dirty="0"/>
               <a:pPr/>
-              <a:t>1/20/19</a:t>
+              <a:t>1/21/19</a:t>
             </a:fld>
             <a:endParaRPr lang="en-US" dirty="0"/>
           </a:p>
@@ -4766,7 +4766,7 @@
             <a:fld id="{B61BEF0D-F0BB-DE4B-95CE-6DB70DBA9567}" type="datetimeFigureOut">
               <a:rPr lang="en-US" dirty="0"/>
               <a:pPr/>
-              <a:t>1/20/19</a:t>
+              <a:t>1/21/19</a:t>
             </a:fld>
             <a:endParaRPr lang="en-US" dirty="0"/>
           </a:p>
@@ -4982,7 +4982,7 @@
             <a:fld id="{B61BEF0D-F0BB-DE4B-95CE-6DB70DBA9567}" type="datetimeFigureOut">
               <a:rPr lang="en-US" dirty="0"/>
               <a:pPr/>
-              <a:t>1/20/19</a:t>
+              <a:t>1/21/19</a:t>
             </a:fld>
             <a:endParaRPr lang="en-US" dirty="0"/>
           </a:p>
@@ -8797,7 +8797,7 @@
         <p:spPr>
           <a:xfrm>
             <a:off x="1731679" y="2557849"/>
-            <a:ext cx="8725466" cy="2646878"/>
+            <a:ext cx="8725466" cy="2369880"/>
           </a:xfrm>
           <a:prstGeom prst="rect">
             <a:avLst/>
@@ -9191,51 +9191,25 @@
             </a:r>
             <a:r>
               <a:rPr lang="de-DE" dirty="0" err="1"/>
-              <a:t>to</a:t>
-            </a:r>
-            <a:r>
-              <a:rPr lang="de-DE" dirty="0"/>
-              <a:t> </a:t>
-            </a:r>
-            <a:r>
-              <a:rPr lang="de-DE" dirty="0" err="1"/>
-              <a:t>validate</a:t>
-            </a:r>
-            <a:br>
-              <a:rPr lang="de-DE" dirty="0"/>
-            </a:br>
-            <a:r>
-              <a:rPr lang="de-DE" dirty="0" err="1"/>
-              <a:t>the</a:t>
-            </a:r>
-            <a:r>
-              <a:rPr lang="de-DE" dirty="0"/>
-              <a:t> </a:t>
-            </a:r>
-            <a:r>
-              <a:rPr lang="de-DE" dirty="0" err="1"/>
-              <a:t>calls</a:t>
-            </a:r>
-            <a:r>
-              <a:rPr lang="de-DE" dirty="0"/>
-              <a:t> </a:t>
-            </a:r>
-            <a:r>
-              <a:rPr lang="de-DE" dirty="0" err="1"/>
               <a:t>with</a:t>
             </a:r>
             <a:r>
               <a:rPr lang="de-DE" dirty="0"/>
-              <a:t> </a:t>
-            </a:r>
-            <a:r>
-              <a:rPr lang="de-DE" dirty="0" err="1"/>
-              <a:t>Mockito.validate</a:t>
-            </a:r>
-            <a:r>
-              <a:rPr lang="de-DE" dirty="0"/>
-              <a:t>()</a:t>
-            </a:r>
+              <a:t> a </a:t>
+            </a:r>
+            <a:r>
+              <a:rPr lang="de-DE" dirty="0" err="1"/>
+              <a:t>Mockito</a:t>
+            </a:r>
+            <a:r>
+              <a:rPr lang="de-DE" dirty="0"/>
+              <a:t> </a:t>
+            </a:r>
+            <a:r>
+              <a:rPr lang="de-DE" dirty="0" err="1"/>
+              <a:t>spy</a:t>
+            </a:r>
+            <a:endParaRPr lang="de-DE" dirty="0"/>
           </a:p>
         </p:txBody>
       </p:sp>

</xml_diff>

<commit_message>
changed @MockBean and @SpyBean Slide
</commit_message>
<xml_diff>
--- a/meetup-presentation.pptx
+++ b/meetup-presentation.pptx
@@ -389,7 +389,7 @@
             <a:fld id="{D57F1E4F-1CFF-5643-939E-217C01CDF565}" type="slidenum">
               <a:rPr lang="en-US" dirty="0"/>
               <a:pPr/>
-              <a:t>‹Nr.›</a:t>
+              <a:t>‹#›</a:t>
             </a:fld>
             <a:endParaRPr lang="en-US" dirty="0"/>
           </a:p>
@@ -694,7 +694,7 @@
             <a:fld id="{D57F1E4F-1CFF-5643-939E-217C01CDF565}" type="slidenum">
               <a:rPr lang="en-US" dirty="0"/>
               <a:pPr/>
-              <a:t>‹Nr.›</a:t>
+              <a:t>‹#›</a:t>
             </a:fld>
             <a:endParaRPr lang="en-US" dirty="0"/>
           </a:p>
@@ -967,7 +967,7 @@
             <a:fld id="{D57F1E4F-1CFF-5643-939E-217C01CDF565}" type="slidenum">
               <a:rPr lang="en-US" dirty="0"/>
               <a:pPr/>
-              <a:t>‹Nr.›</a:t>
+              <a:t>‹#›</a:t>
             </a:fld>
             <a:endParaRPr lang="en-US" dirty="0"/>
           </a:p>
@@ -1455,7 +1455,7 @@
             <a:fld id="{D57F1E4F-1CFF-5643-939E-217C01CDF565}" type="slidenum">
               <a:rPr lang="en-US" dirty="0"/>
               <a:pPr/>
-              <a:t>‹Nr.›</a:t>
+              <a:t>‹#›</a:t>
             </a:fld>
             <a:endParaRPr lang="en-US" dirty="0"/>
           </a:p>
@@ -1649,7 +1649,7 @@
             <a:fld id="{D57F1E4F-1CFF-5643-939E-217C01CDF565}" type="slidenum">
               <a:rPr lang="en-US" dirty="0"/>
               <a:pPr/>
-              <a:t>‹Nr.›</a:t>
+              <a:t>‹#›</a:t>
             </a:fld>
             <a:endParaRPr lang="en-US" dirty="0"/>
           </a:p>
@@ -2244,7 +2244,7 @@
             <a:fld id="{D57F1E4F-1CFF-5643-939E-217C01CDF565}" type="slidenum">
               <a:rPr lang="en-US" dirty="0"/>
               <a:pPr/>
-              <a:t>‹Nr.›</a:t>
+              <a:t>‹#›</a:t>
             </a:fld>
             <a:endParaRPr lang="en-US" dirty="0"/>
           </a:p>
@@ -2595,7 +2595,7 @@
             <a:fld id="{D57F1E4F-1CFF-5643-939E-217C01CDF565}" type="slidenum">
               <a:rPr lang="en-US" dirty="0"/>
               <a:pPr/>
-              <a:t>‹Nr.›</a:t>
+              <a:t>‹#›</a:t>
             </a:fld>
             <a:endParaRPr lang="en-US" dirty="0"/>
           </a:p>
@@ -2755,7 +2755,7 @@
             <a:fld id="{D57F1E4F-1CFF-5643-939E-217C01CDF565}" type="slidenum">
               <a:rPr lang="en-US" dirty="0"/>
               <a:pPr/>
-              <a:t>‹Nr.›</a:t>
+              <a:t>‹#›</a:t>
             </a:fld>
             <a:endParaRPr lang="en-US" dirty="0"/>
           </a:p>
@@ -2920,7 +2920,7 @@
             <a:fld id="{D57F1E4F-1CFF-5643-939E-217C01CDF565}" type="slidenum">
               <a:rPr lang="en-US" dirty="0"/>
               <a:pPr/>
-              <a:t>‹Nr.›</a:t>
+              <a:t>‹#›</a:t>
             </a:fld>
             <a:endParaRPr lang="en-US" dirty="0"/>
           </a:p>
@@ -3075,7 +3075,7 @@
             <a:fld id="{D57F1E4F-1CFF-5643-939E-217C01CDF565}" type="slidenum">
               <a:rPr lang="en-US" dirty="0"/>
               <a:pPr/>
-              <a:t>‹Nr.›</a:t>
+              <a:t>‹#›</a:t>
             </a:fld>
             <a:endParaRPr lang="en-US" dirty="0"/>
           </a:p>
@@ -3346,7 +3346,7 @@
             <a:fld id="{D57F1E4F-1CFF-5643-939E-217C01CDF565}" type="slidenum">
               <a:rPr lang="en-US" dirty="0"/>
               <a:pPr/>
-              <a:t>‹Nr.›</a:t>
+              <a:t>‹#›</a:t>
             </a:fld>
             <a:endParaRPr lang="en-US" dirty="0"/>
           </a:p>
@@ -3599,7 +3599,7 @@
             <a:fld id="{D57F1E4F-1CFF-5643-939E-217C01CDF565}" type="slidenum">
               <a:rPr lang="en-US" dirty="0"/>
               <a:pPr/>
-              <a:t>‹Nr.›</a:t>
+              <a:t>‹#›</a:t>
             </a:fld>
             <a:endParaRPr lang="en-US" dirty="0"/>
           </a:p>
@@ -4000,7 +4000,7 @@
             <a:fld id="{D57F1E4F-1CFF-5643-939E-217C01CDF565}" type="slidenum">
               <a:rPr lang="en-US" dirty="0"/>
               <a:pPr/>
-              <a:t>‹Nr.›</a:t>
+              <a:t>‹#›</a:t>
             </a:fld>
             <a:endParaRPr lang="en-US" dirty="0"/>
           </a:p>
@@ -4127,7 +4127,7 @@
             <a:fld id="{D57F1E4F-1CFF-5643-939E-217C01CDF565}" type="slidenum">
               <a:rPr lang="en-US" dirty="0"/>
               <a:pPr/>
-              <a:t>‹Nr.›</a:t>
+              <a:t>‹#›</a:t>
             </a:fld>
             <a:endParaRPr lang="en-US" dirty="0"/>
           </a:p>
@@ -4231,7 +4231,7 @@
             <a:fld id="{D57F1E4F-1CFF-5643-939E-217C01CDF565}" type="slidenum">
               <a:rPr lang="en-US" dirty="0"/>
               <a:pPr/>
-              <a:t>‹Nr.›</a:t>
+              <a:t>‹#›</a:t>
             </a:fld>
             <a:endParaRPr lang="en-US" dirty="0"/>
           </a:p>
@@ -4504,7 +4504,7 @@
             <a:fld id="{D57F1E4F-1CFF-5643-939E-217C01CDF565}" type="slidenum">
               <a:rPr lang="en-US" dirty="0"/>
               <a:pPr/>
-              <a:t>‹Nr.›</a:t>
+              <a:t>‹#›</a:t>
             </a:fld>
             <a:endParaRPr lang="en-US" dirty="0"/>
           </a:p>
@@ -4819,7 +4819,7 @@
             <a:fld id="{D57F1E4F-1CFF-5643-939E-217C01CDF565}" type="slidenum">
               <a:rPr lang="en-US" dirty="0"/>
               <a:pPr/>
-              <a:t>‹Nr.›</a:t>
+              <a:t>‹#›</a:t>
             </a:fld>
             <a:endParaRPr lang="en-US" dirty="0"/>
           </a:p>
@@ -5077,7 +5077,7 @@
             <a:fld id="{D57F1E4F-1CFF-5643-939E-217C01CDF565}" type="slidenum">
               <a:rPr lang="en-US" dirty="0"/>
               <a:pPr/>
-              <a:t>‹Nr.›</a:t>
+              <a:t>‹#›</a:t>
             </a:fld>
             <a:endParaRPr lang="en-US" dirty="0"/>
           </a:p>
@@ -8759,6 +8759,10 @@
           <a:lstStyle/>
           <a:p>
             <a:r>
+              <a:rPr lang="de-DE" dirty="0"/>
+              <a:t>@</a:t>
+            </a:r>
+            <a:r>
               <a:rPr lang="de-DE" dirty="0" err="1"/>
               <a:t>Mockbean</a:t>
             </a:r>
@@ -8772,7 +8776,7 @@
             </a:r>
             <a:r>
               <a:rPr lang="de-DE" dirty="0"/>
-              <a:t> </a:t>
+              <a:t> @</a:t>
             </a:r>
             <a:r>
               <a:rPr lang="de-DE" dirty="0" err="1"/>
@@ -9174,20 +9178,24 @@
               <a:t> </a:t>
             </a:r>
             <a:r>
-              <a:rPr lang="de-DE" dirty="0" err="1"/>
+              <a:rPr lang="de-DE" u="sng" dirty="0" err="1"/>
               <a:t>wrap</a:t>
             </a:r>
             <a:r>
-              <a:rPr lang="de-DE" dirty="0"/>
+              <a:rPr lang="de-DE" u="sng" dirty="0"/>
               <a:t> an </a:t>
             </a:r>
             <a:r>
-              <a:rPr lang="de-DE" dirty="0" err="1"/>
+              <a:rPr lang="de-DE" u="sng" dirty="0" err="1"/>
               <a:t>existing</a:t>
             </a:r>
             <a:r>
-              <a:rPr lang="de-DE" dirty="0"/>
-              <a:t> Bean </a:t>
+              <a:rPr lang="de-DE" u="sng" dirty="0"/>
+              <a:t> Bean</a:t>
+            </a:r>
+            <a:r>
+              <a:rPr lang="de-DE" dirty="0"/>
+              <a:t> </a:t>
             </a:r>
             <a:r>
               <a:rPr lang="de-DE" dirty="0" err="1"/>

</xml_diff>